<commit_message>
small update to decision graphic
</commit_message>
<xml_diff>
--- a/Presentations/XDSonFHIR-MHD+mXDE+QEDm.pptx
+++ b/Presentations/XDSonFHIR-MHD+mXDE+QEDm.pptx
@@ -227,7 +227,7 @@
           <a:p>
             <a:fld id="{71BE66DA-DE36-4F01-9331-EF645F1F7C5F}" type="datetimeFigureOut">
               <a:rPr lang="en-US" smtClean="0"/>
-              <a:t>2/28/2020</a:t>
+              <a:t>2/29/2020</a:t>
             </a:fld>
             <a:endParaRPr lang="en-US"/>
           </a:p>
@@ -1124,7 +1124,119 @@
           <a:bodyPr/>
           <a:lstStyle/>
           <a:p>
-            <a:endParaRPr lang="en-US"/>
+            <a:r>
+              <a:rPr lang="en-US" sz="1200" b="0" i="0" kern="1200" dirty="0">
+                <a:solidFill>
+                  <a:schemeClr val="tx1"/>
+                </a:solidFill>
+                <a:effectLst/>
+                <a:latin typeface="+mn-lt"/>
+                <a:ea typeface="+mn-ea"/>
+                <a:cs typeface="+mn-cs"/>
+              </a:rPr>
+              <a:t>In the past XDS was used when one wanted to create a Document Sharing HIE, and XCA was used to federate XDS Document Sharing HIE and add in EHR based Document publications. Now IHE has the MHDS infrastructure, so the question is likely to come up.</a:t>
+            </a:r>
+          </a:p>
+          <a:p>
+            <a:br>
+              <a:rPr lang="en-US" sz="1200" b="0" i="0" kern="1200" dirty="0">
+                <a:solidFill>
+                  <a:schemeClr val="tx1"/>
+                </a:solidFill>
+                <a:effectLst/>
+                <a:latin typeface="+mn-lt"/>
+                <a:ea typeface="+mn-ea"/>
+                <a:cs typeface="+mn-cs"/>
+              </a:rPr>
+            </a:br>
+            <a:r>
+              <a:rPr lang="en-US" sz="1200" b="0" i="0" kern="1200" dirty="0">
+                <a:solidFill>
+                  <a:schemeClr val="tx1"/>
+                </a:solidFill>
+                <a:effectLst/>
+                <a:latin typeface="+mn-lt"/>
+                <a:ea typeface="+mn-ea"/>
+                <a:cs typeface="+mn-cs"/>
+              </a:rPr>
+              <a:t>Mostly if you have XDS clients, you need to continue to use XDS or XCA. </a:t>
+            </a:r>
+          </a:p>
+          <a:p>
+            <a:br>
+              <a:rPr lang="en-US" sz="1200" b="0" i="0" kern="1200" dirty="0">
+                <a:solidFill>
+                  <a:schemeClr val="tx1"/>
+                </a:solidFill>
+                <a:effectLst/>
+                <a:latin typeface="+mn-lt"/>
+                <a:ea typeface="+mn-ea"/>
+                <a:cs typeface="+mn-cs"/>
+              </a:rPr>
+            </a:br>
+            <a:r>
+              <a:rPr lang="en-US" sz="1200" b="0" i="0" kern="1200" dirty="0">
+                <a:solidFill>
+                  <a:schemeClr val="tx1"/>
+                </a:solidFill>
+                <a:effectLst/>
+                <a:latin typeface="+mn-lt"/>
+                <a:ea typeface="+mn-ea"/>
+                <a:cs typeface="+mn-cs"/>
+              </a:rPr>
+              <a:t>If you have MHD clients, then you can add MHD to XDS or XCA.</a:t>
+            </a:r>
+            <a:br>
+              <a:rPr lang="en-US" sz="1200" b="0" i="0" kern="1200" dirty="0">
+                <a:solidFill>
+                  <a:schemeClr val="tx1"/>
+                </a:solidFill>
+                <a:effectLst/>
+                <a:latin typeface="+mn-lt"/>
+                <a:ea typeface="+mn-ea"/>
+                <a:cs typeface="+mn-cs"/>
+              </a:rPr>
+            </a:br>
+            <a:endParaRPr lang="en-US" sz="1200" b="0" i="0" kern="1200" dirty="0">
+              <a:solidFill>
+                <a:schemeClr val="tx1"/>
+              </a:solidFill>
+              <a:effectLst/>
+              <a:latin typeface="+mn-lt"/>
+              <a:ea typeface="+mn-ea"/>
+              <a:cs typeface="+mn-cs"/>
+            </a:endParaRPr>
+          </a:p>
+          <a:p>
+            <a:r>
+              <a:rPr lang="en-US" sz="1200" b="0" i="0" kern="1200" dirty="0">
+                <a:solidFill>
+                  <a:schemeClr val="tx1"/>
+                </a:solidFill>
+                <a:effectLst/>
+                <a:latin typeface="+mn-lt"/>
+                <a:ea typeface="+mn-ea"/>
+                <a:cs typeface="+mn-cs"/>
+              </a:rPr>
+              <a:t>If you have no legacy, then it is possible that MHDS is the right platform for you.</a:t>
+            </a:r>
+          </a:p>
+          <a:p>
+            <a:endParaRPr lang="en-US" dirty="0"/>
+          </a:p>
+          <a:p>
+            <a:r>
+              <a:rPr lang="en-US" dirty="0"/>
+              <a:t>There is likely future IHE projects that will federate MHDS, enable connection of MHDS to XCA federations, and add XDS </a:t>
+            </a:r>
+            <a:r>
+              <a:rPr lang="en-US" dirty="0" err="1"/>
+              <a:t>api</a:t>
+            </a:r>
+            <a:r>
+              <a:rPr lang="en-US" dirty="0"/>
+              <a:t> to MHDS. All of these are unusual configurations, so will need market demand to come to the table to make it clear they are needed, vs simply being academic gaps.</a:t>
+            </a:r>
           </a:p>
         </p:txBody>
       </p:sp>
@@ -1135,7 +1247,7 @@
             <a:spLocks noGrp="1"/>
           </p:cNvSpPr>
           <p:nvPr>
-            <p:ph type="sldNum" sz="quarter" idx="10"/>
+            <p:ph type="sldNum" sz="quarter" idx="5"/>
           </p:nvPr>
         </p:nvSpPr>
         <p:spPr/>
@@ -1145,7 +1257,7 @@
           <a:p>
             <a:fld id="{2CFF194C-9619-40B7-9733-83494643ED3C}" type="slidenum">
               <a:rPr lang="en-US" smtClean="0"/>
-              <a:t>23</a:t>
+              <a:t>21</a:t>
             </a:fld>
             <a:endParaRPr lang="en-US"/>
           </a:p>
@@ -1154,7 +1266,7 @@
     </p:spTree>
     <p:extLst>
       <p:ext uri="{BB962C8B-B14F-4D97-AF65-F5344CB8AC3E}">
-        <p14:creationId xmlns:p14="http://schemas.microsoft.com/office/powerpoint/2010/main" val="553753170"/>
+        <p14:creationId xmlns:p14="http://schemas.microsoft.com/office/powerpoint/2010/main" val="3295803476"/>
       </p:ext>
     </p:extLst>
   </p:cSld>
@@ -1208,7 +1320,7 @@
           <a:bodyPr/>
           <a:lstStyle/>
           <a:p>
-            <a:endParaRPr lang="en-US" dirty="0"/>
+            <a:endParaRPr lang="en-US"/>
           </a:p>
         </p:txBody>
       </p:sp>
@@ -1229,7 +1341,7 @@
           <a:p>
             <a:fld id="{2CFF194C-9619-40B7-9733-83494643ED3C}" type="slidenum">
               <a:rPr lang="en-US" smtClean="0"/>
-              <a:t>26</a:t>
+              <a:t>23</a:t>
             </a:fld>
             <a:endParaRPr lang="en-US"/>
           </a:p>
@@ -1238,7 +1350,7 @@
     </p:spTree>
     <p:extLst>
       <p:ext uri="{BB962C8B-B14F-4D97-AF65-F5344CB8AC3E}">
-        <p14:creationId xmlns:p14="http://schemas.microsoft.com/office/powerpoint/2010/main" val="2957338799"/>
+        <p14:creationId xmlns:p14="http://schemas.microsoft.com/office/powerpoint/2010/main" val="553753170"/>
       </p:ext>
     </p:extLst>
   </p:cSld>
@@ -1292,7 +1404,7 @@
           <a:bodyPr/>
           <a:lstStyle/>
           <a:p>
-            <a:endParaRPr lang="en-US"/>
+            <a:endParaRPr lang="en-US" dirty="0"/>
           </a:p>
         </p:txBody>
       </p:sp>
@@ -1313,7 +1425,7 @@
           <a:p>
             <a:fld id="{2CFF194C-9619-40B7-9733-83494643ED3C}" type="slidenum">
               <a:rPr lang="en-US" smtClean="0"/>
-              <a:t>27</a:t>
+              <a:t>26</a:t>
             </a:fld>
             <a:endParaRPr lang="en-US"/>
           </a:p>
@@ -1322,7 +1434,7 @@
     </p:spTree>
     <p:extLst>
       <p:ext uri="{BB962C8B-B14F-4D97-AF65-F5344CB8AC3E}">
-        <p14:creationId xmlns:p14="http://schemas.microsoft.com/office/powerpoint/2010/main" val="1590946692"/>
+        <p14:creationId xmlns:p14="http://schemas.microsoft.com/office/powerpoint/2010/main" val="2957338799"/>
       </p:ext>
     </p:extLst>
   </p:cSld>
@@ -1397,7 +1509,7 @@
           <a:p>
             <a:fld id="{2CFF194C-9619-40B7-9733-83494643ED3C}" type="slidenum">
               <a:rPr lang="en-US" smtClean="0"/>
-              <a:t>29</a:t>
+              <a:t>27</a:t>
             </a:fld>
             <a:endParaRPr lang="en-US"/>
           </a:p>
@@ -1406,7 +1518,7 @@
     </p:spTree>
     <p:extLst>
       <p:ext uri="{BB962C8B-B14F-4D97-AF65-F5344CB8AC3E}">
-        <p14:creationId xmlns:p14="http://schemas.microsoft.com/office/powerpoint/2010/main" val="3182526890"/>
+        <p14:creationId xmlns:p14="http://schemas.microsoft.com/office/powerpoint/2010/main" val="1590946692"/>
       </p:ext>
     </p:extLst>
   </p:cSld>
@@ -1435,96 +1547,54 @@
       </p:grpSpPr>
       <p:sp>
         <p:nvSpPr>
-          <p:cNvPr id="132098" name="Rectangle 7"/>
+          <p:cNvPr id="2" name="Slide Image Placeholder 1"/>
           <p:cNvSpPr>
-            <a:spLocks noGrp="1" noChangeArrowheads="1"/>
-          </p:cNvSpPr>
-          <p:nvPr>
-            <p:ph type="sldNum" sz="quarter" idx="5"/>
-          </p:nvPr>
-        </p:nvSpPr>
-        <p:spPr>
-          <a:noFill/>
-        </p:spPr>
-        <p:txBody>
-          <a:bodyPr/>
-          <a:lstStyle/>
-          <a:p>
-            <a:pPr defTabSz="937797" fontAlgn="base">
-              <a:spcBef>
-                <a:spcPct val="0"/>
-              </a:spcBef>
-              <a:spcAft>
-                <a:spcPct val="0"/>
-              </a:spcAft>
-              <a:defRPr/>
-            </a:pPr>
-            <a:fld id="{1D27111E-FC2B-4A84-BB26-67BA3BE2E651}" type="slidenum">
-              <a:rPr lang="en-US">
-                <a:solidFill>
-                  <a:srgbClr val="000000"/>
-                </a:solidFill>
-                <a:latin typeface="Arial" charset="0"/>
-                <a:cs typeface="Arial" charset="0"/>
-              </a:rPr>
-              <a:pPr defTabSz="937797" fontAlgn="base">
-                <a:spcBef>
-                  <a:spcPct val="0"/>
-                </a:spcBef>
-                <a:spcAft>
-                  <a:spcPct val="0"/>
-                </a:spcAft>
-                <a:defRPr/>
-              </a:pPr>
-              <a:t>30</a:t>
-            </a:fld>
-            <a:endParaRPr lang="en-US" dirty="0">
-              <a:solidFill>
-                <a:srgbClr val="000000"/>
-              </a:solidFill>
-              <a:latin typeface="Arial" charset="0"/>
-              <a:cs typeface="Arial" charset="0"/>
-            </a:endParaRPr>
-          </a:p>
-        </p:txBody>
-      </p:sp>
-      <p:sp>
-        <p:nvSpPr>
-          <p:cNvPr id="132099" name="Rectangle 2"/>
-          <p:cNvSpPr>
-            <a:spLocks noGrp="1" noRot="1" noChangeAspect="1" noChangeArrowheads="1" noTextEdit="1"/>
+            <a:spLocks noGrp="1" noRot="1" noChangeAspect="1"/>
           </p:cNvSpPr>
           <p:nvPr>
             <p:ph type="sldImg"/>
           </p:nvPr>
         </p:nvSpPr>
-        <p:spPr>
-          <a:xfrm>
-            <a:off x="450850" y="720725"/>
-            <a:ext cx="6402388" cy="3602038"/>
-          </a:xfrm>
-          <a:ln/>
-        </p:spPr>
+        <p:spPr/>
       </p:sp>
       <p:sp>
         <p:nvSpPr>
-          <p:cNvPr id="132100" name="Rectangle 3"/>
+          <p:cNvPr id="3" name="Notes Placeholder 2"/>
           <p:cNvSpPr>
-            <a:spLocks noGrp="1" noChangeArrowheads="1"/>
+            <a:spLocks noGrp="1"/>
           </p:cNvSpPr>
           <p:nvPr>
             <p:ph type="body" idx="1"/>
           </p:nvPr>
         </p:nvSpPr>
-        <p:spPr>
-          <a:noFill/>
-          <a:ln/>
-        </p:spPr>
+        <p:spPr/>
         <p:txBody>
           <a:bodyPr/>
           <a:lstStyle/>
           <a:p>
-            <a:pPr eaLnBrk="1" hangingPunct="1"/>
+            <a:endParaRPr lang="en-US"/>
+          </a:p>
+        </p:txBody>
+      </p:sp>
+      <p:sp>
+        <p:nvSpPr>
+          <p:cNvPr id="4" name="Slide Number Placeholder 3"/>
+          <p:cNvSpPr>
+            <a:spLocks noGrp="1"/>
+          </p:cNvSpPr>
+          <p:nvPr>
+            <p:ph type="sldNum" sz="quarter" idx="10"/>
+          </p:nvPr>
+        </p:nvSpPr>
+        <p:spPr/>
+        <p:txBody>
+          <a:bodyPr/>
+          <a:lstStyle/>
+          <a:p>
+            <a:fld id="{2CFF194C-9619-40B7-9733-83494643ED3C}" type="slidenum">
+              <a:rPr lang="en-US" smtClean="0"/>
+              <a:t>29</a:t>
+            </a:fld>
             <a:endParaRPr lang="en-US"/>
           </a:p>
         </p:txBody>
@@ -1532,7 +1602,7 @@
     </p:spTree>
     <p:extLst>
       <p:ext uri="{BB962C8B-B14F-4D97-AF65-F5344CB8AC3E}">
-        <p14:creationId xmlns:p14="http://schemas.microsoft.com/office/powerpoint/2010/main" val="453035399"/>
+        <p14:creationId xmlns:p14="http://schemas.microsoft.com/office/powerpoint/2010/main" val="3182526890"/>
       </p:ext>
     </p:extLst>
   </p:cSld>
@@ -1627,6 +1697,132 @@
 </file>
 
 <file path=ppt/notesSlides/notesSlide20.xml><?xml version="1.0" encoding="utf-8"?>
+<p:notes xmlns:a="http://schemas.openxmlformats.org/drawingml/2006/main" xmlns:r="http://schemas.openxmlformats.org/officeDocument/2006/relationships" xmlns:p="http://schemas.openxmlformats.org/presentationml/2006/main">
+  <p:cSld>
+    <p:spTree>
+      <p:nvGrpSpPr>
+        <p:cNvPr id="1" name=""/>
+        <p:cNvGrpSpPr/>
+        <p:nvPr/>
+      </p:nvGrpSpPr>
+      <p:grpSpPr>
+        <a:xfrm>
+          <a:off x="0" y="0"/>
+          <a:ext cx="0" cy="0"/>
+          <a:chOff x="0" y="0"/>
+          <a:chExt cx="0" cy="0"/>
+        </a:xfrm>
+      </p:grpSpPr>
+      <p:sp>
+        <p:nvSpPr>
+          <p:cNvPr id="132098" name="Rectangle 7"/>
+          <p:cNvSpPr>
+            <a:spLocks noGrp="1" noChangeArrowheads="1"/>
+          </p:cNvSpPr>
+          <p:nvPr>
+            <p:ph type="sldNum" sz="quarter" idx="5"/>
+          </p:nvPr>
+        </p:nvSpPr>
+        <p:spPr>
+          <a:noFill/>
+        </p:spPr>
+        <p:txBody>
+          <a:bodyPr/>
+          <a:lstStyle/>
+          <a:p>
+            <a:pPr defTabSz="937797" fontAlgn="base">
+              <a:spcBef>
+                <a:spcPct val="0"/>
+              </a:spcBef>
+              <a:spcAft>
+                <a:spcPct val="0"/>
+              </a:spcAft>
+              <a:defRPr/>
+            </a:pPr>
+            <a:fld id="{1D27111E-FC2B-4A84-BB26-67BA3BE2E651}" type="slidenum">
+              <a:rPr lang="en-US">
+                <a:solidFill>
+                  <a:srgbClr val="000000"/>
+                </a:solidFill>
+                <a:latin typeface="Arial" charset="0"/>
+                <a:cs typeface="Arial" charset="0"/>
+              </a:rPr>
+              <a:pPr defTabSz="937797" fontAlgn="base">
+                <a:spcBef>
+                  <a:spcPct val="0"/>
+                </a:spcBef>
+                <a:spcAft>
+                  <a:spcPct val="0"/>
+                </a:spcAft>
+                <a:defRPr/>
+              </a:pPr>
+              <a:t>30</a:t>
+            </a:fld>
+            <a:endParaRPr lang="en-US" dirty="0">
+              <a:solidFill>
+                <a:srgbClr val="000000"/>
+              </a:solidFill>
+              <a:latin typeface="Arial" charset="0"/>
+              <a:cs typeface="Arial" charset="0"/>
+            </a:endParaRPr>
+          </a:p>
+        </p:txBody>
+      </p:sp>
+      <p:sp>
+        <p:nvSpPr>
+          <p:cNvPr id="132099" name="Rectangle 2"/>
+          <p:cNvSpPr>
+            <a:spLocks noGrp="1" noRot="1" noChangeAspect="1" noChangeArrowheads="1" noTextEdit="1"/>
+          </p:cNvSpPr>
+          <p:nvPr>
+            <p:ph type="sldImg"/>
+          </p:nvPr>
+        </p:nvSpPr>
+        <p:spPr>
+          <a:xfrm>
+            <a:off x="450850" y="720725"/>
+            <a:ext cx="6402388" cy="3602038"/>
+          </a:xfrm>
+          <a:ln/>
+        </p:spPr>
+      </p:sp>
+      <p:sp>
+        <p:nvSpPr>
+          <p:cNvPr id="132100" name="Rectangle 3"/>
+          <p:cNvSpPr>
+            <a:spLocks noGrp="1" noChangeArrowheads="1"/>
+          </p:cNvSpPr>
+          <p:nvPr>
+            <p:ph type="body" idx="1"/>
+          </p:nvPr>
+        </p:nvSpPr>
+        <p:spPr>
+          <a:noFill/>
+          <a:ln/>
+        </p:spPr>
+        <p:txBody>
+          <a:bodyPr/>
+          <a:lstStyle/>
+          <a:p>
+            <a:pPr eaLnBrk="1" hangingPunct="1"/>
+            <a:endParaRPr lang="en-US"/>
+          </a:p>
+        </p:txBody>
+      </p:sp>
+    </p:spTree>
+    <p:extLst>
+      <p:ext uri="{BB962C8B-B14F-4D97-AF65-F5344CB8AC3E}">
+        <p14:creationId xmlns:p14="http://schemas.microsoft.com/office/powerpoint/2010/main" val="453035399"/>
+      </p:ext>
+    </p:extLst>
+  </p:cSld>
+  <p:clrMapOvr>
+    <a:masterClrMapping/>
+  </p:clrMapOvr>
+</p:notes>
+</file>
+
+<file path=ppt/notesSlides/notesSlide21.xml><?xml version="1.0" encoding="utf-8"?>
 <p:notes xmlns:a="http://schemas.openxmlformats.org/drawingml/2006/main" xmlns:r="http://schemas.openxmlformats.org/officeDocument/2006/relationships" xmlns:p="http://schemas.openxmlformats.org/presentationml/2006/main">
   <p:cSld>
     <p:spTree>
@@ -6259,7 +6455,7 @@
             <a:fld id="{B5FB3126-25FB-F241-9D08-EF0C3CBFF311}" type="datetimeFigureOut">
               <a:rPr lang="en-US" smtClean="0"/>
               <a:pPr/>
-              <a:t>2/28/2020</a:t>
+              <a:t>2/29/2020</a:t>
             </a:fld>
             <a:endParaRPr lang="en-US"/>
           </a:p>
@@ -16016,14 +16212,21 @@
             <p:ph type="title"/>
           </p:nvPr>
         </p:nvSpPr>
-        <p:spPr/>
+        <p:spPr>
+          <a:xfrm>
+            <a:off x="838200" y="365126"/>
+            <a:ext cx="10880834" cy="671274"/>
+          </a:xfrm>
+        </p:spPr>
         <p:txBody>
-          <a:bodyPr/>
+          <a:bodyPr>
+            <a:normAutofit fontScale="90000"/>
+          </a:bodyPr>
           <a:lstStyle/>
           <a:p>
             <a:r>
               <a:rPr lang="en-US" dirty="0"/>
-              <a:t>Which Infrastructure to use (XDS, XCA, MHDS)</a:t>
+              <a:t>MHD Consumer -- Which Infrastructure to use</a:t>
             </a:r>
           </a:p>
         </p:txBody>
@@ -16046,7 +16249,7 @@
         </p:nvSpPr>
         <p:spPr>
           <a:xfrm>
-            <a:off x="8610600" y="5986704"/>
+            <a:off x="8610600" y="6196904"/>
             <a:ext cx="2743200" cy="365125"/>
           </a:xfrm>
         </p:spPr>
@@ -16082,7 +16285,7 @@
         </p:nvSpPr>
         <p:spPr>
           <a:xfrm>
-            <a:off x="1355834" y="1564257"/>
+            <a:off x="1326740" y="1059777"/>
             <a:ext cx="2750340" cy="671274"/>
           </a:xfrm>
           <a:prstGeom prst="rect">
@@ -16129,7 +16332,7 @@
         </p:nvSpPr>
         <p:spPr>
           <a:xfrm>
-            <a:off x="1355834" y="2603036"/>
+            <a:off x="1326740" y="2065440"/>
             <a:ext cx="2750340" cy="671274"/>
           </a:xfrm>
           <a:prstGeom prst="rect">
@@ -16176,7 +16379,7 @@
         </p:nvSpPr>
         <p:spPr>
           <a:xfrm>
-            <a:off x="1355834" y="3641815"/>
+            <a:off x="1326740" y="3071103"/>
             <a:ext cx="2750340" cy="671274"/>
           </a:xfrm>
           <a:prstGeom prst="rect">
@@ -16223,7 +16426,7 @@
         </p:nvSpPr>
         <p:spPr>
           <a:xfrm>
-            <a:off x="1355834" y="4680594"/>
+            <a:off x="1326740" y="4076766"/>
             <a:ext cx="2750340" cy="671274"/>
           </a:xfrm>
           <a:prstGeom prst="rect">
@@ -16270,7 +16473,7 @@
         </p:nvSpPr>
         <p:spPr>
           <a:xfrm>
-            <a:off x="10243513" y="1469292"/>
+            <a:off x="10243513" y="964812"/>
             <a:ext cx="1371600" cy="914400"/>
           </a:xfrm>
           <a:prstGeom prst="ellipse">
@@ -16298,7 +16501,7 @@
             <a:pPr algn="ctr"/>
             <a:r>
               <a:rPr lang="en-US" dirty="0"/>
-              <a:t>XDS</a:t>
+              <a:t>XDS+ MHD</a:t>
             </a:r>
           </a:p>
         </p:txBody>
@@ -16317,7 +16520,7 @@
         </p:nvSpPr>
         <p:spPr>
           <a:xfrm>
-            <a:off x="7635812" y="2520394"/>
+            <a:off x="7635812" y="2015914"/>
             <a:ext cx="1371600" cy="914400"/>
           </a:xfrm>
           <a:prstGeom prst="ellipse">
@@ -16345,7 +16548,7 @@
             <a:pPr algn="ctr"/>
             <a:r>
               <a:rPr lang="en-US" dirty="0"/>
-              <a:t>XCA</a:t>
+              <a:t>XCA+ MHD</a:t>
             </a:r>
           </a:p>
         </p:txBody>
@@ -16364,7 +16567,7 @@
         </p:nvSpPr>
         <p:spPr>
           <a:xfrm>
-            <a:off x="9982200" y="5616226"/>
+            <a:off x="9982200" y="5826426"/>
             <a:ext cx="1371600" cy="914400"/>
           </a:xfrm>
           <a:prstGeom prst="ellipse">
@@ -16415,8 +16618,8 @@
         </p:nvCxnSpPr>
         <p:spPr>
           <a:xfrm>
-            <a:off x="2731004" y="2235531"/>
-            <a:ext cx="0" cy="367505"/>
+            <a:off x="2701910" y="1731051"/>
+            <a:ext cx="0" cy="334389"/>
           </a:xfrm>
           <a:prstGeom prst="straightConnector1">
             <a:avLst/>
@@ -16458,8 +16661,8 @@
         </p:nvCxnSpPr>
         <p:spPr>
           <a:xfrm>
-            <a:off x="4106174" y="2938673"/>
-            <a:ext cx="3529638" cy="38921"/>
+            <a:off x="4077080" y="2401077"/>
+            <a:ext cx="3558732" cy="72037"/>
           </a:xfrm>
           <a:prstGeom prst="straightConnector1">
             <a:avLst/>
@@ -16501,8 +16704,8 @@
         </p:nvCxnSpPr>
         <p:spPr>
           <a:xfrm>
-            <a:off x="4106174" y="3977452"/>
-            <a:ext cx="2604482" cy="697904"/>
+            <a:off x="4077080" y="3406740"/>
+            <a:ext cx="2633576" cy="764136"/>
           </a:xfrm>
           <a:prstGeom prst="straightConnector1">
             <a:avLst/>
@@ -16544,8 +16747,8 @@
         </p:nvCxnSpPr>
         <p:spPr>
           <a:xfrm flipV="1">
-            <a:off x="4106174" y="4675356"/>
-            <a:ext cx="2604482" cy="340875"/>
+            <a:off x="4077080" y="4170876"/>
+            <a:ext cx="2633576" cy="241527"/>
           </a:xfrm>
           <a:prstGeom prst="straightConnector1">
             <a:avLst/>
@@ -16587,8 +16790,8 @@
         </p:nvCxnSpPr>
         <p:spPr>
           <a:xfrm>
-            <a:off x="4106174" y="1899894"/>
-            <a:ext cx="6137339" cy="26598"/>
+            <a:off x="4077080" y="1395414"/>
+            <a:ext cx="6166433" cy="26598"/>
           </a:xfrm>
           <a:prstGeom prst="straightConnector1">
             <a:avLst/>
@@ -16630,8 +16833,8 @@
         </p:nvCxnSpPr>
         <p:spPr>
           <a:xfrm>
-            <a:off x="2731004" y="3274310"/>
-            <a:ext cx="0" cy="367505"/>
+            <a:off x="2701910" y="2736714"/>
+            <a:ext cx="0" cy="334389"/>
           </a:xfrm>
           <a:prstGeom prst="straightConnector1">
             <a:avLst/>
@@ -16673,8 +16876,8 @@
         </p:nvCxnSpPr>
         <p:spPr>
           <a:xfrm>
-            <a:off x="2731004" y="4313089"/>
-            <a:ext cx="0" cy="367505"/>
+            <a:off x="2701910" y="3742377"/>
+            <a:ext cx="0" cy="334389"/>
           </a:xfrm>
           <a:prstGeom prst="straightConnector1">
             <a:avLst/>
@@ -16710,13 +16913,14 @@
           <p:cNvCxnSpPr>
             <a:cxnSpLocks/>
             <a:stCxn id="9" idx="2"/>
+            <a:endCxn id="35" idx="0"/>
           </p:cNvCxnSpPr>
           <p:nvPr/>
         </p:nvCxnSpPr>
         <p:spPr>
           <a:xfrm>
-            <a:off x="2731004" y="5351868"/>
-            <a:ext cx="22699" cy="426367"/>
+            <a:off x="2701910" y="4748040"/>
+            <a:ext cx="0" cy="334389"/>
           </a:xfrm>
           <a:prstGeom prst="straightConnector1">
             <a:avLst/>
@@ -16754,7 +16958,7 @@
         </p:nvSpPr>
         <p:spPr>
           <a:xfrm>
-            <a:off x="1378533" y="5719373"/>
+            <a:off x="1326740" y="6088093"/>
             <a:ext cx="2750340" cy="671274"/>
           </a:xfrm>
           <a:prstGeom prst="rect">
@@ -16804,9 +17008,9 @@
           <p:nvPr/>
         </p:nvCxnSpPr>
         <p:spPr>
-          <a:xfrm>
-            <a:off x="4128873" y="6055010"/>
-            <a:ext cx="5853327" cy="18416"/>
+          <a:xfrm flipV="1">
+            <a:off x="4077080" y="6283626"/>
+            <a:ext cx="5905120" cy="140104"/>
           </a:xfrm>
           <a:prstGeom prst="straightConnector1">
             <a:avLst/>
@@ -16844,7 +17048,7 @@
         </p:nvSpPr>
         <p:spPr>
           <a:xfrm>
-            <a:off x="4367487" y="1610625"/>
+            <a:off x="4367487" y="1106145"/>
             <a:ext cx="512641" cy="369332"/>
           </a:xfrm>
           <a:prstGeom prst="rect">
@@ -16879,7 +17083,7 @@
         </p:nvSpPr>
         <p:spPr>
           <a:xfrm>
-            <a:off x="4356233" y="2601177"/>
+            <a:off x="4356233" y="2096697"/>
             <a:ext cx="512641" cy="369332"/>
           </a:xfrm>
           <a:prstGeom prst="rect">
@@ -16914,7 +17118,7 @@
         </p:nvSpPr>
         <p:spPr>
           <a:xfrm>
-            <a:off x="4354242" y="3591729"/>
+            <a:off x="4354242" y="3087249"/>
             <a:ext cx="512641" cy="369332"/>
           </a:xfrm>
           <a:prstGeom prst="rect">
@@ -16949,7 +17153,7 @@
         </p:nvSpPr>
         <p:spPr>
           <a:xfrm>
-            <a:off x="4356232" y="4544623"/>
+            <a:off x="4356232" y="4040143"/>
             <a:ext cx="512641" cy="369332"/>
           </a:xfrm>
           <a:prstGeom prst="rect">
@@ -16984,7 +17188,7 @@
         </p:nvSpPr>
         <p:spPr>
           <a:xfrm>
-            <a:off x="4361469" y="5649422"/>
+            <a:off x="4278065" y="6037551"/>
             <a:ext cx="512641" cy="369332"/>
           </a:xfrm>
           <a:prstGeom prst="rect">
@@ -17019,7 +17223,7 @@
         </p:nvSpPr>
         <p:spPr>
           <a:xfrm>
-            <a:off x="6710656" y="4339719"/>
+            <a:off x="6710656" y="3835239"/>
             <a:ext cx="2750340" cy="671274"/>
           </a:xfrm>
           <a:prstGeom prst="rect">
@@ -17070,7 +17274,7 @@
         </p:nvCxnSpPr>
         <p:spPr>
           <a:xfrm flipV="1">
-            <a:off x="9460996" y="2249781"/>
+            <a:off x="9460996" y="1745301"/>
             <a:ext cx="983383" cy="2425575"/>
           </a:xfrm>
           <a:prstGeom prst="straightConnector1">
@@ -17113,7 +17317,7 @@
         </p:nvCxnSpPr>
         <p:spPr>
           <a:xfrm flipV="1">
-            <a:off x="8085826" y="3434794"/>
+            <a:off x="8085826" y="2930314"/>
             <a:ext cx="235786" cy="904925"/>
           </a:xfrm>
           <a:prstGeom prst="straightConnector1">
@@ -17152,7 +17356,7 @@
         </p:nvSpPr>
         <p:spPr>
           <a:xfrm>
-            <a:off x="9547575" y="4218094"/>
+            <a:off x="9547575" y="3713614"/>
             <a:ext cx="512641" cy="369332"/>
           </a:xfrm>
           <a:prstGeom prst="rect">
@@ -17187,7 +17391,7 @@
         </p:nvSpPr>
         <p:spPr>
           <a:xfrm>
-            <a:off x="8244952" y="3633045"/>
+            <a:off x="8244952" y="3128565"/>
             <a:ext cx="512641" cy="369332"/>
           </a:xfrm>
           <a:prstGeom prst="rect">
@@ -17208,6 +17412,352 @@
           </a:p>
         </p:txBody>
       </p:sp>
+      <p:sp>
+        <p:nvSpPr>
+          <p:cNvPr id="32" name="Slide Number Placeholder 3">
+            <a:extLst>
+              <a:ext uri="{FF2B5EF4-FFF2-40B4-BE49-F238E27FC236}">
+                <a16:creationId xmlns:a16="http://schemas.microsoft.com/office/drawing/2014/main" id="{70CD743C-9692-48CC-B2A9-46AFA6C46D63}"/>
+              </a:ext>
+            </a:extLst>
+          </p:cNvPr>
+          <p:cNvSpPr txBox="1">
+            <a:spLocks/>
+          </p:cNvSpPr>
+          <p:nvPr/>
+        </p:nvSpPr>
+        <p:spPr>
+          <a:xfrm>
+            <a:off x="8610600" y="5380935"/>
+            <a:ext cx="2743200" cy="365125"/>
+          </a:xfrm>
+          <a:prstGeom prst="rect">
+            <a:avLst/>
+          </a:prstGeom>
+        </p:spPr>
+        <p:txBody>
+          <a:bodyPr vert="horz" lIns="91440" tIns="45720" rIns="91440" bIns="45720" rtlCol="0" anchor="ctr"/>
+          <a:lstStyle>
+            <a:defPPr>
+              <a:defRPr lang="en-US"/>
+            </a:defPPr>
+            <a:lvl1pPr marL="0" algn="r" defTabSz="914400" rtl="0" eaLnBrk="1" latinLnBrk="0" hangingPunct="1">
+              <a:defRPr sz="1200" kern="1200">
+                <a:solidFill>
+                  <a:schemeClr val="tx1">
+                    <a:tint val="75000"/>
+                  </a:schemeClr>
+                </a:solidFill>
+                <a:latin typeface="+mn-lt"/>
+                <a:ea typeface="+mn-ea"/>
+                <a:cs typeface="+mn-cs"/>
+              </a:defRPr>
+            </a:lvl1pPr>
+            <a:lvl2pPr marL="457200" algn="l" defTabSz="914400" rtl="0" eaLnBrk="1" latinLnBrk="0" hangingPunct="1">
+              <a:defRPr sz="1800" kern="1200">
+                <a:solidFill>
+                  <a:schemeClr val="tx1"/>
+                </a:solidFill>
+                <a:latin typeface="+mn-lt"/>
+                <a:ea typeface="+mn-ea"/>
+                <a:cs typeface="+mn-cs"/>
+              </a:defRPr>
+            </a:lvl2pPr>
+            <a:lvl3pPr marL="914400" algn="l" defTabSz="914400" rtl="0" eaLnBrk="1" latinLnBrk="0" hangingPunct="1">
+              <a:defRPr sz="1800" kern="1200">
+                <a:solidFill>
+                  <a:schemeClr val="tx1"/>
+                </a:solidFill>
+                <a:latin typeface="+mn-lt"/>
+                <a:ea typeface="+mn-ea"/>
+                <a:cs typeface="+mn-cs"/>
+              </a:defRPr>
+            </a:lvl3pPr>
+            <a:lvl4pPr marL="1371600" algn="l" defTabSz="914400" rtl="0" eaLnBrk="1" latinLnBrk="0" hangingPunct="1">
+              <a:defRPr sz="1800" kern="1200">
+                <a:solidFill>
+                  <a:schemeClr val="tx1"/>
+                </a:solidFill>
+                <a:latin typeface="+mn-lt"/>
+                <a:ea typeface="+mn-ea"/>
+                <a:cs typeface="+mn-cs"/>
+              </a:defRPr>
+            </a:lvl4pPr>
+            <a:lvl5pPr marL="1828800" algn="l" defTabSz="914400" rtl="0" eaLnBrk="1" latinLnBrk="0" hangingPunct="1">
+              <a:defRPr sz="1800" kern="1200">
+                <a:solidFill>
+                  <a:schemeClr val="tx1"/>
+                </a:solidFill>
+                <a:latin typeface="+mn-lt"/>
+                <a:ea typeface="+mn-ea"/>
+                <a:cs typeface="+mn-cs"/>
+              </a:defRPr>
+            </a:lvl5pPr>
+            <a:lvl6pPr marL="2286000" algn="l" defTabSz="914400" rtl="0" eaLnBrk="1" latinLnBrk="0" hangingPunct="1">
+              <a:defRPr sz="1800" kern="1200">
+                <a:solidFill>
+                  <a:schemeClr val="tx1"/>
+                </a:solidFill>
+                <a:latin typeface="+mn-lt"/>
+                <a:ea typeface="+mn-ea"/>
+                <a:cs typeface="+mn-cs"/>
+              </a:defRPr>
+            </a:lvl6pPr>
+            <a:lvl7pPr marL="2743200" algn="l" defTabSz="914400" rtl="0" eaLnBrk="1" latinLnBrk="0" hangingPunct="1">
+              <a:defRPr sz="1800" kern="1200">
+                <a:solidFill>
+                  <a:schemeClr val="tx1"/>
+                </a:solidFill>
+                <a:latin typeface="+mn-lt"/>
+                <a:ea typeface="+mn-ea"/>
+                <a:cs typeface="+mn-cs"/>
+              </a:defRPr>
+            </a:lvl7pPr>
+            <a:lvl8pPr marL="3200400" algn="l" defTabSz="914400" rtl="0" eaLnBrk="1" latinLnBrk="0" hangingPunct="1">
+              <a:defRPr sz="1800" kern="1200">
+                <a:solidFill>
+                  <a:schemeClr val="tx1"/>
+                </a:solidFill>
+                <a:latin typeface="+mn-lt"/>
+                <a:ea typeface="+mn-ea"/>
+                <a:cs typeface="+mn-cs"/>
+              </a:defRPr>
+            </a:lvl8pPr>
+            <a:lvl9pPr marL="3657600" algn="l" defTabSz="914400" rtl="0" eaLnBrk="1" latinLnBrk="0" hangingPunct="1">
+              <a:defRPr sz="1800" kern="1200">
+                <a:solidFill>
+                  <a:schemeClr val="tx1"/>
+                </a:solidFill>
+                <a:latin typeface="+mn-lt"/>
+                <a:ea typeface="+mn-ea"/>
+                <a:cs typeface="+mn-cs"/>
+              </a:defRPr>
+            </a:lvl9pPr>
+          </a:lstStyle>
+          <a:p>
+            <a:pPr>
+              <a:defRPr/>
+            </a:pPr>
+            <a:fld id="{336892F5-F7A2-420A-8BF3-D2A2054912B1}" type="slidenum">
+              <a:rPr lang="en-US" smtClean="0"/>
+              <a:pPr>
+                <a:defRPr/>
+              </a:pPr>
+              <a:t>21</a:t>
+            </a:fld>
+            <a:endParaRPr lang="en-US"/>
+          </a:p>
+        </p:txBody>
+      </p:sp>
+      <p:sp>
+        <p:nvSpPr>
+          <p:cNvPr id="35" name="Rectangle 34">
+            <a:extLst>
+              <a:ext uri="{FF2B5EF4-FFF2-40B4-BE49-F238E27FC236}">
+                <a16:creationId xmlns:a16="http://schemas.microsoft.com/office/drawing/2014/main" id="{8AE52A65-C009-4FAD-93DC-230A955E103D}"/>
+              </a:ext>
+            </a:extLst>
+          </p:cNvPr>
+          <p:cNvSpPr/>
+          <p:nvPr/>
+        </p:nvSpPr>
+        <p:spPr>
+          <a:xfrm>
+            <a:off x="1326740" y="5082429"/>
+            <a:ext cx="2750340" cy="671274"/>
+          </a:xfrm>
+          <a:prstGeom prst="rect">
+            <a:avLst/>
+          </a:prstGeom>
+        </p:spPr>
+        <p:style>
+          <a:lnRef idx="2">
+            <a:schemeClr val="dk1"/>
+          </a:lnRef>
+          <a:fillRef idx="1">
+            <a:schemeClr val="lt1"/>
+          </a:fillRef>
+          <a:effectRef idx="0">
+            <a:schemeClr val="dk1"/>
+          </a:effectRef>
+          <a:fontRef idx="minor">
+            <a:schemeClr val="dk1"/>
+          </a:fontRef>
+        </p:style>
+        <p:txBody>
+          <a:bodyPr rtlCol="0" anchor="ctr"/>
+          <a:lstStyle/>
+          <a:p>
+            <a:pPr algn="ctr"/>
+            <a:r>
+              <a:rPr lang="en-US" dirty="0"/>
+              <a:t>XDS Document Source/Consumer?</a:t>
+            </a:r>
+          </a:p>
+        </p:txBody>
+      </p:sp>
+      <p:cxnSp>
+        <p:nvCxnSpPr>
+          <p:cNvPr id="36" name="Straight Arrow Connector 35">
+            <a:extLst>
+              <a:ext uri="{FF2B5EF4-FFF2-40B4-BE49-F238E27FC236}">
+                <a16:creationId xmlns:a16="http://schemas.microsoft.com/office/drawing/2014/main" id="{E8B4FE80-72F1-4945-A25B-8504D2B0663A}"/>
+              </a:ext>
+            </a:extLst>
+          </p:cNvPr>
+          <p:cNvCxnSpPr>
+            <a:cxnSpLocks/>
+            <a:stCxn id="35" idx="3"/>
+          </p:cNvCxnSpPr>
+          <p:nvPr/>
+        </p:nvCxnSpPr>
+        <p:spPr>
+          <a:xfrm flipV="1">
+            <a:off x="4077080" y="4991916"/>
+            <a:ext cx="5874340" cy="426150"/>
+          </a:xfrm>
+          <a:prstGeom prst="straightConnector1">
+            <a:avLst/>
+          </a:prstGeom>
+          <a:ln w="50800">
+            <a:tailEnd type="none"/>
+          </a:ln>
+        </p:spPr>
+        <p:style>
+          <a:lnRef idx="1">
+            <a:schemeClr val="dk1"/>
+          </a:lnRef>
+          <a:fillRef idx="0">
+            <a:schemeClr val="dk1"/>
+          </a:fillRef>
+          <a:effectRef idx="0">
+            <a:schemeClr val="dk1"/>
+          </a:effectRef>
+          <a:fontRef idx="minor">
+            <a:schemeClr val="tx1"/>
+          </a:fontRef>
+        </p:style>
+      </p:cxnSp>
+      <p:sp>
+        <p:nvSpPr>
+          <p:cNvPr id="37" name="TextBox 36">
+            <a:extLst>
+              <a:ext uri="{FF2B5EF4-FFF2-40B4-BE49-F238E27FC236}">
+                <a16:creationId xmlns:a16="http://schemas.microsoft.com/office/drawing/2014/main" id="{14B10319-E63C-47DA-B68F-43290D7260C4}"/>
+              </a:ext>
+            </a:extLst>
+          </p:cNvPr>
+          <p:cNvSpPr txBox="1"/>
+          <p:nvPr/>
+        </p:nvSpPr>
+        <p:spPr>
+          <a:xfrm>
+            <a:off x="4361469" y="5043653"/>
+            <a:ext cx="512641" cy="369332"/>
+          </a:xfrm>
+          <a:prstGeom prst="rect">
+            <a:avLst/>
+          </a:prstGeom>
+          <a:noFill/>
+        </p:spPr>
+        <p:txBody>
+          <a:bodyPr wrap="none" rtlCol="0">
+            <a:spAutoFit/>
+          </a:bodyPr>
+          <a:lstStyle/>
+          <a:p>
+            <a:r>
+              <a:rPr lang="en-US" dirty="0"/>
+              <a:t>YES</a:t>
+            </a:r>
+          </a:p>
+        </p:txBody>
+      </p:sp>
+      <p:cxnSp>
+        <p:nvCxnSpPr>
+          <p:cNvPr id="40" name="Straight Arrow Connector 39">
+            <a:extLst>
+              <a:ext uri="{FF2B5EF4-FFF2-40B4-BE49-F238E27FC236}">
+                <a16:creationId xmlns:a16="http://schemas.microsoft.com/office/drawing/2014/main" id="{7838CF80-331E-42AA-98DA-08969B167BA0}"/>
+              </a:ext>
+            </a:extLst>
+          </p:cNvPr>
+          <p:cNvCxnSpPr>
+            <a:cxnSpLocks/>
+            <a:stCxn id="35" idx="2"/>
+            <a:endCxn id="43" idx="0"/>
+          </p:cNvCxnSpPr>
+          <p:nvPr/>
+        </p:nvCxnSpPr>
+        <p:spPr>
+          <a:xfrm>
+            <a:off x="2701910" y="5753703"/>
+            <a:ext cx="0" cy="334390"/>
+          </a:xfrm>
+          <a:prstGeom prst="straightConnector1">
+            <a:avLst/>
+          </a:prstGeom>
+          <a:ln w="50800">
+            <a:tailEnd type="triangle"/>
+          </a:ln>
+        </p:spPr>
+        <p:style>
+          <a:lnRef idx="1">
+            <a:schemeClr val="dk1"/>
+          </a:lnRef>
+          <a:fillRef idx="0">
+            <a:schemeClr val="dk1"/>
+          </a:fillRef>
+          <a:effectRef idx="0">
+            <a:schemeClr val="dk1"/>
+          </a:effectRef>
+          <a:fontRef idx="minor">
+            <a:schemeClr val="tx1"/>
+          </a:fontRef>
+        </p:style>
+      </p:cxnSp>
+      <p:cxnSp>
+        <p:nvCxnSpPr>
+          <p:cNvPr id="45" name="Straight Arrow Connector 44">
+            <a:extLst>
+              <a:ext uri="{FF2B5EF4-FFF2-40B4-BE49-F238E27FC236}">
+                <a16:creationId xmlns:a16="http://schemas.microsoft.com/office/drawing/2014/main" id="{6467E0C7-289A-40B2-B2A5-E328C1D815D7}"/>
+              </a:ext>
+            </a:extLst>
+          </p:cNvPr>
+          <p:cNvCxnSpPr>
+            <a:cxnSpLocks/>
+            <a:endCxn id="10" idx="4"/>
+          </p:cNvCxnSpPr>
+          <p:nvPr/>
+        </p:nvCxnSpPr>
+        <p:spPr>
+          <a:xfrm flipV="1">
+            <a:off x="9929599" y="1879212"/>
+            <a:ext cx="999714" cy="3124975"/>
+          </a:xfrm>
+          <a:prstGeom prst="straightConnector1">
+            <a:avLst/>
+          </a:prstGeom>
+          <a:ln w="50800">
+            <a:tailEnd type="triangle"/>
+          </a:ln>
+        </p:spPr>
+        <p:style>
+          <a:lnRef idx="1">
+            <a:schemeClr val="dk1"/>
+          </a:lnRef>
+          <a:fillRef idx="0">
+            <a:schemeClr val="dk1"/>
+          </a:fillRef>
+          <a:effectRef idx="0">
+            <a:schemeClr val="dk1"/>
+          </a:effectRef>
+          <a:fontRef idx="minor">
+            <a:schemeClr val="tx1"/>
+          </a:fontRef>
+        </p:style>
+      </p:cxnSp>
     </p:spTree>
     <p:extLst>
       <p:ext uri="{BB962C8B-B14F-4D97-AF65-F5344CB8AC3E}">

</xml_diff>

<commit_message>
minor edits to mXDE intro
</commit_message>
<xml_diff>
--- a/Presentations/XDSonFHIR-MHD+mXDE+QEDm.pptx
+++ b/Presentations/XDSonFHIR-MHD+mXDE+QEDm.pptx
@@ -1320,7 +1320,30 @@
           <a:bodyPr/>
           <a:lstStyle/>
           <a:p>
-            <a:endParaRPr lang="en-US"/>
+            <a:r>
+              <a:rPr lang="en-US" dirty="0"/>
+              <a:t>Documents are good at documenting facts of an encounter or episode or summary from an organization perspective</a:t>
+            </a:r>
+          </a:p>
+          <a:p>
+            <a:r>
+              <a:rPr lang="en-US" dirty="0"/>
+              <a:t>Fine-Grain FHIR Resources are more easy to get to the point, less noise</a:t>
+            </a:r>
+          </a:p>
+          <a:p>
+            <a:r>
+              <a:rPr lang="en-US" dirty="0"/>
+              <a:t>But, imagine you are a </a:t>
+            </a:r>
+            <a:r>
+              <a:rPr lang="en-US" dirty="0" err="1"/>
+              <a:t>clinian</a:t>
+            </a:r>
+            <a:r>
+              <a:rPr lang="en-US" dirty="0"/>
+              <a:t> and have come to a diagnosis based on a set of data including some fine-grain FHIR Resources derived from documents;  The Provenance would allow you to go see how many documents and to see the document content to fully understand the context of that data.  Medical Records integrity and authenticity</a:t>
+            </a:r>
           </a:p>
         </p:txBody>
       </p:sp>
@@ -17722,11 +17745,11 @@
   <p:clrMapOvr>
     <a:masterClrMapping/>
   </p:clrMapOvr>
-  <mc:AlternateContent xmlns:mc="http://schemas.openxmlformats.org/markup-compatibility/2006">
-    <mc:Choice xmlns:p14="http://schemas.microsoft.com/office/powerpoint/2010/main" Requires="p14">
+  <mc:AlternateContent xmlns:mc="http://schemas.openxmlformats.org/markup-compatibility/2006" xmlns:p14="http://schemas.microsoft.com/office/powerpoint/2010/main">
+    <mc:Choice Requires="p14">
       <p:transition spd="slow" p14:dur="2000" advTm="70413"/>
     </mc:Choice>
-    <mc:Fallback>
+    <mc:Fallback xmlns="">
       <p:transition spd="slow" advTm="70413"/>
     </mc:Fallback>
   </mc:AlternateContent>
@@ -17775,32 +17798,7 @@
           <a:p>
             <a:r>
               <a:rPr lang="en-US" dirty="0"/>
-              <a:t>Decomposed Documents </a:t>
-            </a:r>
-            <a:r>
-              <a:rPr lang="en-US" dirty="0">
-                <a:sym typeface="Wingdings" panose="05000000000000000000" pitchFamily="2" charset="2"/>
-              </a:rPr>
-              <a:t></a:t>
-            </a:r>
-            <a:br>
-              <a:rPr lang="en-US">
-                <a:sym typeface="Wingdings" panose="05000000000000000000" pitchFamily="2" charset="2"/>
-              </a:rPr>
-            </a:br>
-            <a:r>
-              <a:rPr lang="en-US">
-                <a:sym typeface="Wingdings" panose="05000000000000000000" pitchFamily="2" charset="2"/>
-              </a:rPr>
-              <a:t>	</a:t>
-            </a:r>
-            <a:r>
-              <a:rPr lang="en-US"/>
-              <a:t>Consuming </a:t>
-            </a:r>
-            <a:r>
-              <a:rPr lang="en-US" dirty="0"/>
-              <a:t>Resources</a:t>
+              <a:t>Consuming Fine-Grain Resources</a:t>
             </a:r>
           </a:p>
         </p:txBody>
@@ -17982,7 +17980,7 @@
           <a:p>
             <a:r>
               <a:rPr lang="en-US" sz="2000" dirty="0"/>
-              <a:t>Consume FHIR Resources (Observation, </a:t>
+              <a:t>Consume fine-grain FHIR Resources (Observation, </a:t>
             </a:r>
             <a:r>
               <a:rPr lang="en-US" sz="2000" dirty="0" err="1"/>
@@ -18019,16 +18017,7 @@
           <a:p>
             <a:r>
               <a:rPr lang="en-US" sz="2000" dirty="0"/>
-              <a:t>Clinicians using Apps will need to reference the source and thus clinical context of data element</a:t>
-            </a:r>
-          </a:p>
-          <a:p>
-            <a:pPr marL="0" indent="0">
-              <a:buNone/>
-            </a:pPr>
-            <a:r>
-              <a:rPr lang="en-US" sz="2000" dirty="0"/>
-              <a:t>Note: MHD Retrieve Document could support service that converts the original document to FHIR-Document</a:t>
+              <a:t>Clinicians decisions based on fine-grain FHIR Resources will need to reference the source and thus clinical context of data – cross-enterprise adds emphasis of need for Provenance</a:t>
             </a:r>
           </a:p>
         </p:txBody>

</xml_diff>